<commit_message>
Attemping psi4 built-in torsion scan, can use pymol or chimera to generate structures independently.
</commit_message>
<xml_diff>
--- a/Overview.pptx
+++ b/Overview.pptx
@@ -10,8 +10,10 @@
     <p:sldId id="257" r:id="rId4"/>
     <p:sldId id="258" r:id="rId5"/>
     <p:sldId id="259" r:id="rId6"/>
-    <p:sldId id="262" r:id="rId7"/>
-    <p:sldId id="260" r:id="rId8"/>
+    <p:sldId id="263" r:id="rId7"/>
+    <p:sldId id="262" r:id="rId8"/>
+    <p:sldId id="260" r:id="rId9"/>
+    <p:sldId id="264" r:id="rId10"/>
   </p:sldIdLst>
   <p:sldSz cx="12192000" cy="6858000"/>
   <p:notesSz cx="6858000" cy="9144000"/>
@@ -110,6 +112,11 @@
       </a:defRPr>
     </a:lvl9pPr>
   </p:defaultTextStyle>
+  <p:extLst>
+    <p:ext uri="{EFAFB233-063F-42B5-8137-9DF3F51BA10A}">
+      <p15:sldGuideLst xmlns:p15="http://schemas.microsoft.com/office/powerpoint/2012/main"/>
+    </p:ext>
+  </p:extLst>
 </p:presentation>
 </file>
 
@@ -264,7 +271,7 @@
           <a:p>
             <a:fld id="{F3CD3ABC-5867-476F-ADD1-12BA1440BCEA}" type="datetimeFigureOut">
               <a:rPr lang="en-US" smtClean="0"/>
-              <a:t>11/16/2017</a:t>
+              <a:t>11/17/2017</a:t>
             </a:fld>
             <a:endParaRPr lang="en-US"/>
           </a:p>
@@ -462,7 +469,7 @@
           <a:p>
             <a:fld id="{F3CD3ABC-5867-476F-ADD1-12BA1440BCEA}" type="datetimeFigureOut">
               <a:rPr lang="en-US" smtClean="0"/>
-              <a:t>11/16/2017</a:t>
+              <a:t>11/17/2017</a:t>
             </a:fld>
             <a:endParaRPr lang="en-US"/>
           </a:p>
@@ -670,7 +677,7 @@
           <a:p>
             <a:fld id="{F3CD3ABC-5867-476F-ADD1-12BA1440BCEA}" type="datetimeFigureOut">
               <a:rPr lang="en-US" smtClean="0"/>
-              <a:t>11/16/2017</a:t>
+              <a:t>11/17/2017</a:t>
             </a:fld>
             <a:endParaRPr lang="en-US"/>
           </a:p>
@@ -868,7 +875,7 @@
           <a:p>
             <a:fld id="{F3CD3ABC-5867-476F-ADD1-12BA1440BCEA}" type="datetimeFigureOut">
               <a:rPr lang="en-US" smtClean="0"/>
-              <a:t>11/16/2017</a:t>
+              <a:t>11/17/2017</a:t>
             </a:fld>
             <a:endParaRPr lang="en-US"/>
           </a:p>
@@ -1143,7 +1150,7 @@
           <a:p>
             <a:fld id="{F3CD3ABC-5867-476F-ADD1-12BA1440BCEA}" type="datetimeFigureOut">
               <a:rPr lang="en-US" smtClean="0"/>
-              <a:t>11/16/2017</a:t>
+              <a:t>11/17/2017</a:t>
             </a:fld>
             <a:endParaRPr lang="en-US"/>
           </a:p>
@@ -1408,7 +1415,7 @@
           <a:p>
             <a:fld id="{F3CD3ABC-5867-476F-ADD1-12BA1440BCEA}" type="datetimeFigureOut">
               <a:rPr lang="en-US" smtClean="0"/>
-              <a:t>11/16/2017</a:t>
+              <a:t>11/17/2017</a:t>
             </a:fld>
             <a:endParaRPr lang="en-US"/>
           </a:p>
@@ -1820,7 +1827,7 @@
           <a:p>
             <a:fld id="{F3CD3ABC-5867-476F-ADD1-12BA1440BCEA}" type="datetimeFigureOut">
               <a:rPr lang="en-US" smtClean="0"/>
-              <a:t>11/16/2017</a:t>
+              <a:t>11/17/2017</a:t>
             </a:fld>
             <a:endParaRPr lang="en-US"/>
           </a:p>
@@ -1961,7 +1968,7 @@
           <a:p>
             <a:fld id="{F3CD3ABC-5867-476F-ADD1-12BA1440BCEA}" type="datetimeFigureOut">
               <a:rPr lang="en-US" smtClean="0"/>
-              <a:t>11/16/2017</a:t>
+              <a:t>11/17/2017</a:t>
             </a:fld>
             <a:endParaRPr lang="en-US"/>
           </a:p>
@@ -2074,7 +2081,7 @@
           <a:p>
             <a:fld id="{F3CD3ABC-5867-476F-ADD1-12BA1440BCEA}" type="datetimeFigureOut">
               <a:rPr lang="en-US" smtClean="0"/>
-              <a:t>11/16/2017</a:t>
+              <a:t>11/17/2017</a:t>
             </a:fld>
             <a:endParaRPr lang="en-US"/>
           </a:p>
@@ -2385,7 +2392,7 @@
           <a:p>
             <a:fld id="{F3CD3ABC-5867-476F-ADD1-12BA1440BCEA}" type="datetimeFigureOut">
               <a:rPr lang="en-US" smtClean="0"/>
-              <a:t>11/16/2017</a:t>
+              <a:t>11/17/2017</a:t>
             </a:fld>
             <a:endParaRPr lang="en-US"/>
           </a:p>
@@ -2673,7 +2680,7 @@
           <a:p>
             <a:fld id="{F3CD3ABC-5867-476F-ADD1-12BA1440BCEA}" type="datetimeFigureOut">
               <a:rPr lang="en-US" smtClean="0"/>
-              <a:t>11/16/2017</a:t>
+              <a:t>11/17/2017</a:t>
             </a:fld>
             <a:endParaRPr lang="en-US"/>
           </a:p>
@@ -2914,7 +2921,7 @@
           <a:p>
             <a:fld id="{F3CD3ABC-5867-476F-ADD1-12BA1440BCEA}" type="datetimeFigureOut">
               <a:rPr lang="en-US" smtClean="0"/>
-              <a:t>11/16/2017</a:t>
+              <a:t>11/17/2017</a:t>
             </a:fld>
             <a:endParaRPr lang="en-US"/>
           </a:p>
@@ -3964,63 +3971,82 @@
           <a:chExt cx="0" cy="0"/>
         </a:xfrm>
       </p:grpSpPr>
-      <p:sp>
-        <p:nvSpPr>
-          <p:cNvPr id="2" name="Title 1">
-            <a:extLst>
-              <a:ext uri="{FF2B5EF4-FFF2-40B4-BE49-F238E27FC236}">
-                <a16:creationId xmlns:a16="http://schemas.microsoft.com/office/drawing/2014/main" id="{C9355654-4903-4ADC-A221-73BF5BBC6DC0}"/>
-              </a:ext>
-            </a:extLst>
-          </p:cNvPr>
-          <p:cNvSpPr>
-            <a:spLocks noGrp="1"/>
-          </p:cNvSpPr>
-          <p:nvPr>
-            <p:ph type="title"/>
-          </p:nvPr>
-        </p:nvSpPr>
-        <p:spPr/>
-        <p:txBody>
-          <a:bodyPr/>
+      <p:pic>
+        <p:nvPicPr>
+          <p:cNvPr id="3" name="Picture 2">
+            <a:extLst>
+              <a:ext uri="{FF2B5EF4-FFF2-40B4-BE49-F238E27FC236}">
+                <a16:creationId xmlns:a16="http://schemas.microsoft.com/office/drawing/2014/main" id="{72C9FB56-473E-4717-81DF-E14EFB409852}"/>
+              </a:ext>
+            </a:extLst>
+          </p:cNvPr>
+          <p:cNvPicPr>
+            <a:picLocks noChangeAspect="1"/>
+          </p:cNvPicPr>
+          <p:nvPr/>
+        </p:nvPicPr>
+        <p:blipFill>
+          <a:blip r:embed="rId2">
+            <a:extLst>
+              <a:ext uri="{28A0092B-C50C-407E-A947-70E740481C1C}">
+                <a14:useLocalDpi xmlns:a14="http://schemas.microsoft.com/office/drawing/2010/main" val="0"/>
+              </a:ext>
+            </a:extLst>
+          </a:blip>
+          <a:stretch>
+            <a:fillRect/>
+          </a:stretch>
+        </p:blipFill>
+        <p:spPr>
+          <a:xfrm>
+            <a:off x="0" y="0"/>
+            <a:ext cx="8310477" cy="6858000"/>
+          </a:xfrm>
+          <a:prstGeom prst="rect">
+            <a:avLst/>
+          </a:prstGeom>
+        </p:spPr>
+      </p:pic>
+      <p:sp>
+        <p:nvSpPr>
+          <p:cNvPr id="10" name="TextBox 9">
+            <a:extLst>
+              <a:ext uri="{FF2B5EF4-FFF2-40B4-BE49-F238E27FC236}">
+                <a16:creationId xmlns:a16="http://schemas.microsoft.com/office/drawing/2014/main" id="{CBB29003-DB24-4277-B763-7B92272409AE}"/>
+              </a:ext>
+            </a:extLst>
+          </p:cNvPr>
+          <p:cNvSpPr txBox="1"/>
+          <p:nvPr/>
+        </p:nvSpPr>
+        <p:spPr>
+          <a:xfrm>
+            <a:off x="2904565" y="309282"/>
+            <a:ext cx="1005403" cy="369332"/>
+          </a:xfrm>
+          <a:prstGeom prst="rect">
+            <a:avLst/>
+          </a:prstGeom>
+          <a:noFill/>
+        </p:spPr>
+        <p:txBody>
+          <a:bodyPr wrap="none" rtlCol="0">
+            <a:spAutoFit/>
+          </a:bodyPr>
           <a:lstStyle/>
           <a:p>
             <a:r>
               <a:rPr lang="en-US" dirty="0"/>
-              <a:t>Torsion scan</a:t>
-            </a:r>
-          </a:p>
-        </p:txBody>
-      </p:sp>
-      <p:sp>
-        <p:nvSpPr>
-          <p:cNvPr id="3" name="Text Placeholder 2">
-            <a:extLst>
-              <a:ext uri="{FF2B5EF4-FFF2-40B4-BE49-F238E27FC236}">
-                <a16:creationId xmlns:a16="http://schemas.microsoft.com/office/drawing/2014/main" id="{37550700-87AD-4BD6-9A0B-EF143444E71A}"/>
-              </a:ext>
-            </a:extLst>
-          </p:cNvPr>
-          <p:cNvSpPr>
-            <a:spLocks noGrp="1"/>
-          </p:cNvSpPr>
-          <p:nvPr>
-            <p:ph type="body" idx="1"/>
-          </p:nvPr>
-        </p:nvSpPr>
-        <p:spPr/>
-        <p:txBody>
-          <a:bodyPr/>
-          <a:lstStyle/>
-          <a:p>
-            <a:endParaRPr lang="en-US"/>
+              <a:t>6-31G**</a:t>
+            </a:r>
+            <a:endParaRPr lang="en-US" b="1" dirty="0"/>
           </a:p>
         </p:txBody>
       </p:sp>
     </p:spTree>
     <p:extLst>
       <p:ext uri="{BB962C8B-B14F-4D97-AF65-F5344CB8AC3E}">
-        <p14:creationId xmlns:p14="http://schemas.microsoft.com/office/powerpoint/2010/main" val="2446167208"/>
+        <p14:creationId xmlns:p14="http://schemas.microsoft.com/office/powerpoint/2010/main" val="581229504"/>
       </p:ext>
     </p:extLst>
   </p:cSld>
@@ -4047,6 +4073,89 @@
           <a:chExt cx="0" cy="0"/>
         </a:xfrm>
       </p:grpSpPr>
+      <p:sp>
+        <p:nvSpPr>
+          <p:cNvPr id="2" name="Title 1">
+            <a:extLst>
+              <a:ext uri="{FF2B5EF4-FFF2-40B4-BE49-F238E27FC236}">
+                <a16:creationId xmlns:a16="http://schemas.microsoft.com/office/drawing/2014/main" id="{C9355654-4903-4ADC-A221-73BF5BBC6DC0}"/>
+              </a:ext>
+            </a:extLst>
+          </p:cNvPr>
+          <p:cNvSpPr>
+            <a:spLocks noGrp="1"/>
+          </p:cNvSpPr>
+          <p:nvPr>
+            <p:ph type="title"/>
+          </p:nvPr>
+        </p:nvSpPr>
+        <p:spPr/>
+        <p:txBody>
+          <a:bodyPr/>
+          <a:lstStyle/>
+          <a:p>
+            <a:r>
+              <a:rPr lang="en-US" dirty="0"/>
+              <a:t>Torsion scan</a:t>
+            </a:r>
+          </a:p>
+        </p:txBody>
+      </p:sp>
+      <p:sp>
+        <p:nvSpPr>
+          <p:cNvPr id="3" name="Text Placeholder 2">
+            <a:extLst>
+              <a:ext uri="{FF2B5EF4-FFF2-40B4-BE49-F238E27FC236}">
+                <a16:creationId xmlns:a16="http://schemas.microsoft.com/office/drawing/2014/main" id="{37550700-87AD-4BD6-9A0B-EF143444E71A}"/>
+              </a:ext>
+            </a:extLst>
+          </p:cNvPr>
+          <p:cNvSpPr>
+            <a:spLocks noGrp="1"/>
+          </p:cNvSpPr>
+          <p:nvPr>
+            <p:ph type="body" idx="1"/>
+          </p:nvPr>
+        </p:nvSpPr>
+        <p:spPr/>
+        <p:txBody>
+          <a:bodyPr/>
+          <a:lstStyle/>
+          <a:p>
+            <a:endParaRPr lang="en-US"/>
+          </a:p>
+        </p:txBody>
+      </p:sp>
+    </p:spTree>
+    <p:extLst>
+      <p:ext uri="{BB962C8B-B14F-4D97-AF65-F5344CB8AC3E}">
+        <p14:creationId xmlns:p14="http://schemas.microsoft.com/office/powerpoint/2010/main" val="2446167208"/>
+      </p:ext>
+    </p:extLst>
+  </p:cSld>
+  <p:clrMapOvr>
+    <a:masterClrMapping/>
+  </p:clrMapOvr>
+</p:sld>
+</file>
+
+<file path=ppt/slides/slide8.xml><?xml version="1.0" encoding="utf-8"?>
+<p:sld xmlns:a="http://schemas.openxmlformats.org/drawingml/2006/main" xmlns:r="http://schemas.openxmlformats.org/officeDocument/2006/relationships" xmlns:p="http://schemas.openxmlformats.org/presentationml/2006/main">
+  <p:cSld>
+    <p:spTree>
+      <p:nvGrpSpPr>
+        <p:cNvPr id="1" name=""/>
+        <p:cNvGrpSpPr/>
+        <p:nvPr/>
+      </p:nvGrpSpPr>
+      <p:grpSpPr>
+        <a:xfrm>
+          <a:off x="0" y="0"/>
+          <a:ext cx="0" cy="0"/>
+          <a:chOff x="0" y="0"/>
+          <a:chExt cx="0" cy="0"/>
+        </a:xfrm>
+      </p:grpSpPr>
       <p:pic>
         <p:nvPicPr>
           <p:cNvPr id="3" name="Picture 2">
@@ -4227,6 +4336,107 @@
     <p:extLst>
       <p:ext uri="{BB962C8B-B14F-4D97-AF65-F5344CB8AC3E}">
         <p14:creationId xmlns:p14="http://schemas.microsoft.com/office/powerpoint/2010/main" val="3208906135"/>
+      </p:ext>
+    </p:extLst>
+  </p:cSld>
+  <p:clrMapOvr>
+    <a:masterClrMapping/>
+  </p:clrMapOvr>
+</p:sld>
+</file>
+
+<file path=ppt/slides/slide9.xml><?xml version="1.0" encoding="utf-8"?>
+<p:sld xmlns:a="http://schemas.openxmlformats.org/drawingml/2006/main" xmlns:r="http://schemas.openxmlformats.org/officeDocument/2006/relationships" xmlns:p="http://schemas.openxmlformats.org/presentationml/2006/main">
+  <p:cSld>
+    <p:spTree>
+      <p:nvGrpSpPr>
+        <p:cNvPr id="1" name=""/>
+        <p:cNvGrpSpPr/>
+        <p:nvPr/>
+      </p:nvGrpSpPr>
+      <p:grpSpPr>
+        <a:xfrm>
+          <a:off x="0" y="0"/>
+          <a:ext cx="0" cy="0"/>
+          <a:chOff x="0" y="0"/>
+          <a:chExt cx="0" cy="0"/>
+        </a:xfrm>
+      </p:grpSpPr>
+      <p:pic>
+        <p:nvPicPr>
+          <p:cNvPr id="8" name="Picture 7">
+            <a:extLst>
+              <a:ext uri="{FF2B5EF4-FFF2-40B4-BE49-F238E27FC236}">
+                <a16:creationId xmlns:a16="http://schemas.microsoft.com/office/drawing/2014/main" id="{67788592-3C52-41D3-823F-76D081AEDE09}"/>
+              </a:ext>
+            </a:extLst>
+          </p:cNvPr>
+          <p:cNvPicPr>
+            <a:picLocks noChangeAspect="1"/>
+          </p:cNvPicPr>
+          <p:nvPr/>
+        </p:nvPicPr>
+        <p:blipFill>
+          <a:blip r:embed="rId2">
+            <a:extLst>
+              <a:ext uri="{28A0092B-C50C-407E-A947-70E740481C1C}">
+                <a14:useLocalDpi xmlns:a14="http://schemas.microsoft.com/office/drawing/2010/main" val="0"/>
+              </a:ext>
+            </a:extLst>
+          </a:blip>
+          <a:stretch>
+            <a:fillRect/>
+          </a:stretch>
+        </p:blipFill>
+        <p:spPr>
+          <a:xfrm>
+            <a:off x="0" y="0"/>
+            <a:ext cx="8038137" cy="6858000"/>
+          </a:xfrm>
+          <a:prstGeom prst="rect">
+            <a:avLst/>
+          </a:prstGeom>
+        </p:spPr>
+      </p:pic>
+      <p:sp>
+        <p:nvSpPr>
+          <p:cNvPr id="4" name="TextBox 3">
+            <a:extLst>
+              <a:ext uri="{FF2B5EF4-FFF2-40B4-BE49-F238E27FC236}">
+                <a16:creationId xmlns:a16="http://schemas.microsoft.com/office/drawing/2014/main" id="{080D6223-7FEC-49B3-8B8E-346326738C77}"/>
+              </a:ext>
+            </a:extLst>
+          </p:cNvPr>
+          <p:cNvSpPr txBox="1"/>
+          <p:nvPr/>
+        </p:nvSpPr>
+        <p:spPr>
+          <a:xfrm>
+            <a:off x="0" y="0"/>
+            <a:ext cx="9674508" cy="369332"/>
+          </a:xfrm>
+          <a:prstGeom prst="rect">
+            <a:avLst/>
+          </a:prstGeom>
+          <a:noFill/>
+        </p:spPr>
+        <p:txBody>
+          <a:bodyPr wrap="none" rtlCol="0">
+            <a:spAutoFit/>
+          </a:bodyPr>
+          <a:lstStyle/>
+          <a:p>
+            <a:r>
+              <a:rPr lang="en-US" dirty="0"/>
+              <a:t>For the “locked” motion, I think both the double bond and single bond need to rotate together.</a:t>
+            </a:r>
+          </a:p>
+        </p:txBody>
+      </p:sp>
+    </p:spTree>
+    <p:extLst>
+      <p:ext uri="{BB962C8B-B14F-4D97-AF65-F5344CB8AC3E}">
+        <p14:creationId xmlns:p14="http://schemas.microsoft.com/office/powerpoint/2010/main" val="1620086375"/>
       </p:ext>
     </p:extLst>
   </p:cSld>

</xml_diff>

<commit_message>
Pulled in scan results from TSCC and updating documentation
</commit_message>
<xml_diff>
--- a/Overview.pptx
+++ b/Overview.pptx
@@ -14,6 +14,8 @@
     <p:sldId id="262" r:id="rId8"/>
     <p:sldId id="260" r:id="rId9"/>
     <p:sldId id="264" r:id="rId10"/>
+    <p:sldId id="265" r:id="rId11"/>
+    <p:sldId id="266" r:id="rId12"/>
   </p:sldIdLst>
   <p:sldSz cx="12192000" cy="6858000"/>
   <p:notesSz cx="6858000" cy="9144000"/>
@@ -271,7 +273,7 @@
           <a:p>
             <a:fld id="{F3CD3ABC-5867-476F-ADD1-12BA1440BCEA}" type="datetimeFigureOut">
               <a:rPr lang="en-US" smtClean="0"/>
-              <a:t>11/17/2017</a:t>
+              <a:t>11/20/2017</a:t>
             </a:fld>
             <a:endParaRPr lang="en-US"/>
           </a:p>
@@ -469,7 +471,7 @@
           <a:p>
             <a:fld id="{F3CD3ABC-5867-476F-ADD1-12BA1440BCEA}" type="datetimeFigureOut">
               <a:rPr lang="en-US" smtClean="0"/>
-              <a:t>11/17/2017</a:t>
+              <a:t>11/20/2017</a:t>
             </a:fld>
             <a:endParaRPr lang="en-US"/>
           </a:p>
@@ -677,7 +679,7 @@
           <a:p>
             <a:fld id="{F3CD3ABC-5867-476F-ADD1-12BA1440BCEA}" type="datetimeFigureOut">
               <a:rPr lang="en-US" smtClean="0"/>
-              <a:t>11/17/2017</a:t>
+              <a:t>11/20/2017</a:t>
             </a:fld>
             <a:endParaRPr lang="en-US"/>
           </a:p>
@@ -875,7 +877,7 @@
           <a:p>
             <a:fld id="{F3CD3ABC-5867-476F-ADD1-12BA1440BCEA}" type="datetimeFigureOut">
               <a:rPr lang="en-US" smtClean="0"/>
-              <a:t>11/17/2017</a:t>
+              <a:t>11/20/2017</a:t>
             </a:fld>
             <a:endParaRPr lang="en-US"/>
           </a:p>
@@ -1150,7 +1152,7 @@
           <a:p>
             <a:fld id="{F3CD3ABC-5867-476F-ADD1-12BA1440BCEA}" type="datetimeFigureOut">
               <a:rPr lang="en-US" smtClean="0"/>
-              <a:t>11/17/2017</a:t>
+              <a:t>11/20/2017</a:t>
             </a:fld>
             <a:endParaRPr lang="en-US"/>
           </a:p>
@@ -1415,7 +1417,7 @@
           <a:p>
             <a:fld id="{F3CD3ABC-5867-476F-ADD1-12BA1440BCEA}" type="datetimeFigureOut">
               <a:rPr lang="en-US" smtClean="0"/>
-              <a:t>11/17/2017</a:t>
+              <a:t>11/20/2017</a:t>
             </a:fld>
             <a:endParaRPr lang="en-US"/>
           </a:p>
@@ -1827,7 +1829,7 @@
           <a:p>
             <a:fld id="{F3CD3ABC-5867-476F-ADD1-12BA1440BCEA}" type="datetimeFigureOut">
               <a:rPr lang="en-US" smtClean="0"/>
-              <a:t>11/17/2017</a:t>
+              <a:t>11/20/2017</a:t>
             </a:fld>
             <a:endParaRPr lang="en-US"/>
           </a:p>
@@ -1968,7 +1970,7 @@
           <a:p>
             <a:fld id="{F3CD3ABC-5867-476F-ADD1-12BA1440BCEA}" type="datetimeFigureOut">
               <a:rPr lang="en-US" smtClean="0"/>
-              <a:t>11/17/2017</a:t>
+              <a:t>11/20/2017</a:t>
             </a:fld>
             <a:endParaRPr lang="en-US"/>
           </a:p>
@@ -2081,7 +2083,7 @@
           <a:p>
             <a:fld id="{F3CD3ABC-5867-476F-ADD1-12BA1440BCEA}" type="datetimeFigureOut">
               <a:rPr lang="en-US" smtClean="0"/>
-              <a:t>11/17/2017</a:t>
+              <a:t>11/20/2017</a:t>
             </a:fld>
             <a:endParaRPr lang="en-US"/>
           </a:p>
@@ -2392,7 +2394,7 @@
           <a:p>
             <a:fld id="{F3CD3ABC-5867-476F-ADD1-12BA1440BCEA}" type="datetimeFigureOut">
               <a:rPr lang="en-US" smtClean="0"/>
-              <a:t>11/17/2017</a:t>
+              <a:t>11/20/2017</a:t>
             </a:fld>
             <a:endParaRPr lang="en-US"/>
           </a:p>
@@ -2680,7 +2682,7 @@
           <a:p>
             <a:fld id="{F3CD3ABC-5867-476F-ADD1-12BA1440BCEA}" type="datetimeFigureOut">
               <a:rPr lang="en-US" smtClean="0"/>
-              <a:t>11/17/2017</a:t>
+              <a:t>11/20/2017</a:t>
             </a:fld>
             <a:endParaRPr lang="en-US"/>
           </a:p>
@@ -2921,7 +2923,7 @@
           <a:p>
             <a:fld id="{F3CD3ABC-5867-476F-ADD1-12BA1440BCEA}" type="datetimeFigureOut">
               <a:rPr lang="en-US" smtClean="0"/>
-              <a:t>11/17/2017</a:t>
+              <a:t>11/20/2017</a:t>
             </a:fld>
             <a:endParaRPr lang="en-US"/>
           </a:p>
@@ -3404,6 +3406,412 @@
 </p:sld>
 </file>
 
+<file path=ppt/slides/slide10.xml><?xml version="1.0" encoding="utf-8"?>
+<p:sld xmlns:a="http://schemas.openxmlformats.org/drawingml/2006/main" xmlns:r="http://schemas.openxmlformats.org/officeDocument/2006/relationships" xmlns:p="http://schemas.openxmlformats.org/presentationml/2006/main">
+  <p:cSld>
+    <p:spTree>
+      <p:nvGrpSpPr>
+        <p:cNvPr id="1" name=""/>
+        <p:cNvGrpSpPr/>
+        <p:nvPr/>
+      </p:nvGrpSpPr>
+      <p:grpSpPr>
+        <a:xfrm>
+          <a:off x="0" y="0"/>
+          <a:ext cx="0" cy="0"/>
+          <a:chOff x="0" y="0"/>
+          <a:chExt cx="0" cy="0"/>
+        </a:xfrm>
+      </p:grpSpPr>
+      <p:sp>
+        <p:nvSpPr>
+          <p:cNvPr id="4" name="Rectangle 3">
+            <a:extLst>
+              <a:ext uri="{FF2B5EF4-FFF2-40B4-BE49-F238E27FC236}">
+                <a16:creationId xmlns:a16="http://schemas.microsoft.com/office/drawing/2014/main" id="{B2A56571-2BC6-41F5-A314-DCED84213282}"/>
+              </a:ext>
+            </a:extLst>
+          </p:cNvPr>
+          <p:cNvSpPr/>
+          <p:nvPr/>
+        </p:nvSpPr>
+        <p:spPr>
+          <a:xfrm>
+            <a:off x="0" y="1443841"/>
+            <a:ext cx="6096000" cy="3970318"/>
+          </a:xfrm>
+          <a:prstGeom prst="rect">
+            <a:avLst/>
+          </a:prstGeom>
+        </p:spPr>
+        <p:txBody>
+          <a:bodyPr>
+            <a:spAutoFit/>
+          </a:bodyPr>
+          <a:lstStyle/>
+          <a:p>
+            <a:r>
+              <a:rPr lang="pt-BR" dirty="0">
+                <a:latin typeface="Consolas" panose="020B0609020204030204" pitchFamily="49" charset="0"/>
+              </a:rPr>
+              <a:t>memory 8000 mb</a:t>
+            </a:r>
+          </a:p>
+          <a:p>
+            <a:endParaRPr lang="pt-BR" dirty="0">
+              <a:latin typeface="Consolas" panose="020B0609020204030204" pitchFamily="49" charset="0"/>
+            </a:endParaRPr>
+          </a:p>
+          <a:p>
+            <a:r>
+              <a:rPr lang="pt-BR" dirty="0">
+                <a:latin typeface="Consolas" panose="020B0609020204030204" pitchFamily="49" charset="0"/>
+              </a:rPr>
+              <a:t>molecule  {</a:t>
+            </a:r>
+          </a:p>
+          <a:p>
+            <a:r>
+              <a:rPr lang="pt-BR" dirty="0">
+                <a:latin typeface="Consolas" panose="020B0609020204030204" pitchFamily="49" charset="0"/>
+              </a:rPr>
+              <a:t>  0 1 </a:t>
+            </a:r>
+          </a:p>
+          <a:p>
+            <a:r>
+              <a:rPr lang="pt-BR" dirty="0">
+                <a:latin typeface="Consolas" panose="020B0609020204030204" pitchFamily="49" charset="0"/>
+              </a:rPr>
+              <a:t>  C      1.718   2.544   6.070</a:t>
+            </a:r>
+          </a:p>
+          <a:p>
+            <a:r>
+              <a:rPr lang="pt-BR" dirty="0">
+                <a:latin typeface="Consolas" panose="020B0609020204030204" pitchFamily="49" charset="0"/>
+              </a:rPr>
+              <a:t>  O      0.737   5.835   12.405</a:t>
+            </a:r>
+          </a:p>
+          <a:p>
+            <a:r>
+              <a:rPr lang="pt-BR" dirty="0">
+                <a:latin typeface="Consolas" panose="020B0609020204030204" pitchFamily="49" charset="0"/>
+              </a:rPr>
+              <a:t>...</a:t>
+            </a:r>
+          </a:p>
+          <a:p>
+            <a:r>
+              <a:rPr lang="pt-BR" dirty="0">
+                <a:latin typeface="Consolas" panose="020B0609020204030204" pitchFamily="49" charset="0"/>
+              </a:rPr>
+              <a:t>units Angstrom</a:t>
+            </a:r>
+          </a:p>
+          <a:p>
+            <a:r>
+              <a:rPr lang="pt-BR" dirty="0">
+                <a:latin typeface="Consolas" panose="020B0609020204030204" pitchFamily="49" charset="0"/>
+              </a:rPr>
+              <a:t>}</a:t>
+            </a:r>
+          </a:p>
+          <a:p>
+            <a:endParaRPr lang="pt-BR" dirty="0">
+              <a:latin typeface="Consolas" panose="020B0609020204030204" pitchFamily="49" charset="0"/>
+            </a:endParaRPr>
+          </a:p>
+          <a:p>
+            <a:r>
+              <a:rPr lang="pt-BR" dirty="0">
+                <a:latin typeface="Consolas" panose="020B0609020204030204" pitchFamily="49" charset="0"/>
+              </a:rPr>
+              <a:t>dih_string = "17 4 2 5 0.001"</a:t>
+            </a:r>
+          </a:p>
+          <a:p>
+            <a:r>
+              <a:rPr lang="pt-BR" dirty="0">
+                <a:latin typeface="Consolas" panose="020B0609020204030204" pitchFamily="49" charset="0"/>
+              </a:rPr>
+              <a:t>set optking fixed_dihedral = $dih_string</a:t>
+            </a:r>
+          </a:p>
+          <a:p>
+            <a:endParaRPr lang="pt-BR" dirty="0">
+              <a:latin typeface="Consolas" panose="020B0609020204030204" pitchFamily="49" charset="0"/>
+            </a:endParaRPr>
+          </a:p>
+          <a:p>
+            <a:r>
+              <a:rPr lang="pt-BR" dirty="0">
+                <a:latin typeface="Consolas" panose="020B0609020204030204" pitchFamily="49" charset="0"/>
+              </a:rPr>
+              <a:t>optimize('B3LYP/3-21G')</a:t>
+            </a:r>
+          </a:p>
+        </p:txBody>
+      </p:sp>
+      <p:pic>
+        <p:nvPicPr>
+          <p:cNvPr id="5" name="Picture 4">
+            <a:extLst>
+              <a:ext uri="{FF2B5EF4-FFF2-40B4-BE49-F238E27FC236}">
+                <a16:creationId xmlns:a16="http://schemas.microsoft.com/office/drawing/2014/main" id="{2B7E8435-563E-40D8-B528-F0C1B5C74A2A}"/>
+              </a:ext>
+            </a:extLst>
+          </p:cNvPr>
+          <p:cNvPicPr>
+            <a:picLocks noChangeAspect="1"/>
+          </p:cNvPicPr>
+          <p:nvPr/>
+        </p:nvPicPr>
+        <p:blipFill>
+          <a:blip r:embed="rId2"/>
+          <a:stretch>
+            <a:fillRect/>
+          </a:stretch>
+        </p:blipFill>
+        <p:spPr>
+          <a:xfrm>
+            <a:off x="0" y="8156"/>
+            <a:ext cx="7343775" cy="457200"/>
+          </a:xfrm>
+          <a:prstGeom prst="rect">
+            <a:avLst/>
+          </a:prstGeom>
+        </p:spPr>
+      </p:pic>
+      <p:pic>
+        <p:nvPicPr>
+          <p:cNvPr id="6" name="Picture 5">
+            <a:extLst>
+              <a:ext uri="{FF2B5EF4-FFF2-40B4-BE49-F238E27FC236}">
+                <a16:creationId xmlns:a16="http://schemas.microsoft.com/office/drawing/2014/main" id="{5E1BC7D2-9A1A-4E9D-B254-412C7024C4C2}"/>
+              </a:ext>
+            </a:extLst>
+          </p:cNvPr>
+          <p:cNvPicPr>
+            <a:picLocks noChangeAspect="1"/>
+          </p:cNvPicPr>
+          <p:nvPr/>
+        </p:nvPicPr>
+        <p:blipFill>
+          <a:blip r:embed="rId3"/>
+          <a:stretch>
+            <a:fillRect/>
+          </a:stretch>
+        </p:blipFill>
+        <p:spPr>
+          <a:xfrm>
+            <a:off x="-1" y="773623"/>
+            <a:ext cx="7343775" cy="361950"/>
+          </a:xfrm>
+          <a:prstGeom prst="rect">
+            <a:avLst/>
+          </a:prstGeom>
+        </p:spPr>
+      </p:pic>
+    </p:spTree>
+    <p:extLst>
+      <p:ext uri="{BB962C8B-B14F-4D97-AF65-F5344CB8AC3E}">
+        <p14:creationId xmlns:p14="http://schemas.microsoft.com/office/powerpoint/2010/main" val="321324350"/>
+      </p:ext>
+    </p:extLst>
+  </p:cSld>
+  <p:clrMapOvr>
+    <a:masterClrMapping/>
+  </p:clrMapOvr>
+</p:sld>
+</file>
+
+<file path=ppt/slides/slide11.xml><?xml version="1.0" encoding="utf-8"?>
+<p:sld xmlns:a="http://schemas.openxmlformats.org/drawingml/2006/main" xmlns:r="http://schemas.openxmlformats.org/officeDocument/2006/relationships" xmlns:p="http://schemas.openxmlformats.org/presentationml/2006/main">
+  <p:cSld>
+    <p:spTree>
+      <p:nvGrpSpPr>
+        <p:cNvPr id="1" name=""/>
+        <p:cNvGrpSpPr/>
+        <p:nvPr/>
+      </p:nvGrpSpPr>
+      <p:grpSpPr>
+        <a:xfrm>
+          <a:off x="0" y="0"/>
+          <a:ext cx="0" cy="0"/>
+          <a:chOff x="0" y="0"/>
+          <a:chExt cx="0" cy="0"/>
+        </a:xfrm>
+      </p:grpSpPr>
+      <p:pic>
+        <p:nvPicPr>
+          <p:cNvPr id="2" name="Picture 1">
+            <a:extLst>
+              <a:ext uri="{FF2B5EF4-FFF2-40B4-BE49-F238E27FC236}">
+                <a16:creationId xmlns:a16="http://schemas.microsoft.com/office/drawing/2014/main" id="{82C1E1C4-B4EC-4AA3-8036-B80DF4B434D3}"/>
+              </a:ext>
+            </a:extLst>
+          </p:cNvPr>
+          <p:cNvPicPr>
+            <a:picLocks noChangeAspect="1"/>
+          </p:cNvPicPr>
+          <p:nvPr/>
+        </p:nvPicPr>
+        <p:blipFill>
+          <a:blip r:embed="rId2">
+            <a:extLst>
+              <a:ext uri="{28A0092B-C50C-407E-A947-70E740481C1C}">
+                <a14:useLocalDpi xmlns:a14="http://schemas.microsoft.com/office/drawing/2010/main" val="0"/>
+              </a:ext>
+            </a:extLst>
+          </a:blip>
+          <a:stretch>
+            <a:fillRect/>
+          </a:stretch>
+        </p:blipFill>
+        <p:spPr>
+          <a:xfrm>
+            <a:off x="-1" y="16375"/>
+            <a:ext cx="8842917" cy="6841625"/>
+          </a:xfrm>
+          <a:prstGeom prst="rect">
+            <a:avLst/>
+          </a:prstGeom>
+        </p:spPr>
+      </p:pic>
+      <p:sp>
+        <p:nvSpPr>
+          <p:cNvPr id="3" name="TextBox 2">
+            <a:extLst>
+              <a:ext uri="{FF2B5EF4-FFF2-40B4-BE49-F238E27FC236}">
+                <a16:creationId xmlns:a16="http://schemas.microsoft.com/office/drawing/2014/main" id="{760385AA-91A6-4D67-8FDD-AA6B49741761}"/>
+              </a:ext>
+            </a:extLst>
+          </p:cNvPr>
+          <p:cNvSpPr txBox="1"/>
+          <p:nvPr/>
+        </p:nvSpPr>
+        <p:spPr>
+          <a:xfrm>
+            <a:off x="0" y="0"/>
+            <a:ext cx="5536644" cy="646331"/>
+          </a:xfrm>
+          <a:prstGeom prst="rect">
+            <a:avLst/>
+          </a:prstGeom>
+          <a:noFill/>
+        </p:spPr>
+        <p:txBody>
+          <a:bodyPr wrap="none" rtlCol="0">
+            <a:spAutoFit/>
+          </a:bodyPr>
+          <a:lstStyle/>
+          <a:p>
+            <a:r>
+              <a:rPr lang="en-US" dirty="0"/>
+              <a:t>Didn’t complete B3LYP/cc-PVDZ or B3LYP/6-31G*.</a:t>
+            </a:r>
+          </a:p>
+          <a:p>
+            <a:r>
+              <a:rPr lang="en-US" dirty="0"/>
+              <a:t>Even running B3LYP/3-21G, convergence is difficult.</a:t>
+            </a:r>
+          </a:p>
+        </p:txBody>
+      </p:sp>
+      <p:cxnSp>
+        <p:nvCxnSpPr>
+          <p:cNvPr id="6" name="Straight Arrow Connector 5">
+            <a:extLst>
+              <a:ext uri="{FF2B5EF4-FFF2-40B4-BE49-F238E27FC236}">
+                <a16:creationId xmlns:a16="http://schemas.microsoft.com/office/drawing/2014/main" id="{105DA6B7-62DB-48F8-A282-68F75B69D8AE}"/>
+              </a:ext>
+            </a:extLst>
+          </p:cNvPr>
+          <p:cNvCxnSpPr/>
+          <p:nvPr/>
+        </p:nvCxnSpPr>
+        <p:spPr>
+          <a:xfrm>
+            <a:off x="1527717" y="5452946"/>
+            <a:ext cx="4917688" cy="0"/>
+          </a:xfrm>
+          <a:prstGeom prst="straightConnector1">
+            <a:avLst/>
+          </a:prstGeom>
+          <a:ln w="38100">
+            <a:solidFill>
+              <a:schemeClr val="tx1"/>
+            </a:solidFill>
+            <a:headEnd type="triangle" w="med" len="med"/>
+            <a:tailEnd type="triangle" w="med" len="med"/>
+          </a:ln>
+        </p:spPr>
+        <p:style>
+          <a:lnRef idx="1">
+            <a:schemeClr val="accent1"/>
+          </a:lnRef>
+          <a:fillRef idx="0">
+            <a:schemeClr val="accent1"/>
+          </a:fillRef>
+          <a:effectRef idx="0">
+            <a:schemeClr val="accent1"/>
+          </a:effectRef>
+          <a:fontRef idx="minor">
+            <a:schemeClr val="tx1"/>
+          </a:fontRef>
+        </p:style>
+      </p:cxnSp>
+      <p:sp>
+        <p:nvSpPr>
+          <p:cNvPr id="7" name="TextBox 6">
+            <a:extLst>
+              <a:ext uri="{FF2B5EF4-FFF2-40B4-BE49-F238E27FC236}">
+                <a16:creationId xmlns:a16="http://schemas.microsoft.com/office/drawing/2014/main" id="{248B8A07-F503-4D97-A0B0-9CFE026D6813}"/>
+              </a:ext>
+            </a:extLst>
+          </p:cNvPr>
+          <p:cNvSpPr txBox="1"/>
+          <p:nvPr/>
+        </p:nvSpPr>
+        <p:spPr>
+          <a:xfrm>
+            <a:off x="2606243" y="5083614"/>
+            <a:ext cx="3358612" cy="369332"/>
+          </a:xfrm>
+          <a:prstGeom prst="rect">
+            <a:avLst/>
+          </a:prstGeom>
+          <a:noFill/>
+        </p:spPr>
+        <p:txBody>
+          <a:bodyPr wrap="none" rtlCol="0">
+            <a:spAutoFit/>
+          </a:bodyPr>
+          <a:lstStyle/>
+          <a:p>
+            <a:r>
+              <a:rPr lang="en-US" dirty="0"/>
+              <a:t>~8 hours on 4 cores with 8 GB </a:t>
+            </a:r>
+          </a:p>
+        </p:txBody>
+      </p:sp>
+    </p:spTree>
+    <p:extLst>
+      <p:ext uri="{BB962C8B-B14F-4D97-AF65-F5344CB8AC3E}">
+        <p14:creationId xmlns:p14="http://schemas.microsoft.com/office/powerpoint/2010/main" val="3114408355"/>
+      </p:ext>
+    </p:extLst>
+  </p:cSld>
+  <p:clrMapOvr>
+    <a:masterClrMapping/>
+  </p:clrMapOvr>
+</p:sld>
+</file>
+
 <file path=ppt/slides/slide2.xml><?xml version="1.0" encoding="utf-8"?>
 <p:sld xmlns:a="http://schemas.openxmlformats.org/drawingml/2006/main" xmlns:r="http://schemas.openxmlformats.org/officeDocument/2006/relationships" xmlns:p="http://schemas.openxmlformats.org/presentationml/2006/main">
   <p:cSld>
@@ -4433,6 +4841,36 @@
           </a:p>
         </p:txBody>
       </p:sp>
+      <p:pic>
+        <p:nvPicPr>
+          <p:cNvPr id="2" name="Picture 1">
+            <a:extLst>
+              <a:ext uri="{FF2B5EF4-FFF2-40B4-BE49-F238E27FC236}">
+                <a16:creationId xmlns:a16="http://schemas.microsoft.com/office/drawing/2014/main" id="{76D93003-601D-4971-92A2-9CCE0EF76EA7}"/>
+              </a:ext>
+            </a:extLst>
+          </p:cNvPr>
+          <p:cNvPicPr>
+            <a:picLocks noChangeAspect="1"/>
+          </p:cNvPicPr>
+          <p:nvPr/>
+        </p:nvPicPr>
+        <p:blipFill>
+          <a:blip r:embed="rId3"/>
+          <a:stretch>
+            <a:fillRect/>
+          </a:stretch>
+        </p:blipFill>
+        <p:spPr>
+          <a:xfrm>
+            <a:off x="9603419" y="-3517"/>
+            <a:ext cx="2588581" cy="6858000"/>
+          </a:xfrm>
+          <a:prstGeom prst="rect">
+            <a:avLst/>
+          </a:prstGeom>
+        </p:spPr>
+      </p:pic>
     </p:spTree>
     <p:extLst>
       <p:ext uri="{BB962C8B-B14F-4D97-AF65-F5344CB8AC3E}">

</xml_diff>